<commit_message>
SUBIDA ya desde el Beta para tenerlo online
</commit_message>
<xml_diff>
--- a/R2_vs_flujo.pptx
+++ b/R2_vs_flujo.pptx
@@ -138,7 +138,7 @@
           <a:lstStyle/>
           <a:p>
             <a:pPr>
-              <a:defRPr sz="1400" b="0" i="0" u="none" strike="noStrike" kern="1200" spc="0" baseline="0">
+              <a:defRPr sz="1440" b="0" i="0" u="none" strike="noStrike" kern="1200" spc="0" baseline="0">
                 <a:solidFill>
                   <a:schemeClr val="tx1">
                     <a:lumMod val="65000"/>
@@ -170,7 +170,7 @@
         <a:lstStyle/>
         <a:p>
           <a:pPr>
-            <a:defRPr sz="1400" b="0" i="0" u="none" strike="noStrike" kern="1200" spc="0" baseline="0">
+            <a:defRPr sz="1440" b="0" i="0" u="none" strike="noStrike" kern="1200" spc="0" baseline="0">
               <a:solidFill>
                 <a:schemeClr val="tx1">
                   <a:lumMod val="65000"/>
@@ -2296,6 +2296,61 @@
             <a:effectLst/>
           </c:spPr>
         </c:majorGridlines>
+        <c:title>
+          <c:tx>
+            <c:rich>
+              <a:bodyPr rot="0" spcFirstLastPara="1" vertOverflow="ellipsis" vert="horz" wrap="square" anchor="ctr" anchorCtr="1"/>
+              <a:lstStyle/>
+              <a:p>
+                <a:pPr>
+                  <a:defRPr sz="1200" b="0" i="0" u="none" strike="noStrike" kern="1200" baseline="0">
+                    <a:solidFill>
+                      <a:schemeClr val="tx1">
+                        <a:lumMod val="65000"/>
+                        <a:lumOff val="35000"/>
+                      </a:schemeClr>
+                    </a:solidFill>
+                    <a:latin typeface="+mn-lt"/>
+                    <a:ea typeface="+mn-ea"/>
+                    <a:cs typeface="+mn-cs"/>
+                  </a:defRPr>
+                </a:pPr>
+                <a:r>
+                  <a:rPr lang="es-ES"/>
+                  <a:t>Flujo</a:t>
+                </a:r>
+              </a:p>
+            </c:rich>
+          </c:tx>
+          <c:overlay val="0"/>
+          <c:spPr>
+            <a:noFill/>
+            <a:ln>
+              <a:noFill/>
+            </a:ln>
+            <a:effectLst/>
+          </c:spPr>
+          <c:txPr>
+            <a:bodyPr rot="0" spcFirstLastPara="1" vertOverflow="ellipsis" vert="horz" wrap="square" anchor="ctr" anchorCtr="1"/>
+            <a:lstStyle/>
+            <a:p>
+              <a:pPr>
+                <a:defRPr sz="1200" b="0" i="0" u="none" strike="noStrike" kern="1200" baseline="0">
+                  <a:solidFill>
+                    <a:schemeClr val="tx1">
+                      <a:lumMod val="65000"/>
+                      <a:lumOff val="35000"/>
+                    </a:schemeClr>
+                  </a:solidFill>
+                  <a:latin typeface="+mn-lt"/>
+                  <a:ea typeface="+mn-ea"/>
+                  <a:cs typeface="+mn-cs"/>
+                </a:defRPr>
+              </a:pPr>
+              <a:endParaRPr lang="es-ES"/>
+            </a:p>
+          </c:txPr>
+        </c:title>
         <c:numFmt formatCode="General" sourceLinked="1"/>
         <c:majorTickMark val="none"/>
         <c:minorTickMark val="none"/>
@@ -2318,7 +2373,7 @@
           <a:lstStyle/>
           <a:p>
             <a:pPr>
-              <a:defRPr sz="900" b="0" i="0" u="none" strike="noStrike" kern="1200" baseline="0">
+              <a:defRPr sz="1200" b="0" i="0" u="none" strike="noStrike" kern="1200" baseline="0">
                 <a:solidFill>
                   <a:schemeClr val="tx1">
                     <a:lumMod val="65000"/>
@@ -2358,6 +2413,61 @@
             <a:effectLst/>
           </c:spPr>
         </c:majorGridlines>
+        <c:title>
+          <c:tx>
+            <c:rich>
+              <a:bodyPr rot="-5400000" spcFirstLastPara="1" vertOverflow="ellipsis" vert="horz" wrap="square" anchor="ctr" anchorCtr="1"/>
+              <a:lstStyle/>
+              <a:p>
+                <a:pPr>
+                  <a:defRPr sz="1200" b="0" i="0" u="none" strike="noStrike" kern="1200" baseline="0">
+                    <a:solidFill>
+                      <a:schemeClr val="tx1">
+                        <a:lumMod val="65000"/>
+                        <a:lumOff val="35000"/>
+                      </a:schemeClr>
+                    </a:solidFill>
+                    <a:latin typeface="+mn-lt"/>
+                    <a:ea typeface="+mn-ea"/>
+                    <a:cs typeface="+mn-cs"/>
+                  </a:defRPr>
+                </a:pPr>
+                <a:r>
+                  <a:rPr lang="es-ES"/>
+                  <a:t>R2</a:t>
+                </a:r>
+              </a:p>
+            </c:rich>
+          </c:tx>
+          <c:overlay val="0"/>
+          <c:spPr>
+            <a:noFill/>
+            <a:ln>
+              <a:noFill/>
+            </a:ln>
+            <a:effectLst/>
+          </c:spPr>
+          <c:txPr>
+            <a:bodyPr rot="-5400000" spcFirstLastPara="1" vertOverflow="ellipsis" vert="horz" wrap="square" anchor="ctr" anchorCtr="1"/>
+            <a:lstStyle/>
+            <a:p>
+              <a:pPr>
+                <a:defRPr sz="1200" b="0" i="0" u="none" strike="noStrike" kern="1200" baseline="0">
+                  <a:solidFill>
+                    <a:schemeClr val="tx1">
+                      <a:lumMod val="65000"/>
+                      <a:lumOff val="35000"/>
+                    </a:schemeClr>
+                  </a:solidFill>
+                  <a:latin typeface="+mn-lt"/>
+                  <a:ea typeface="+mn-ea"/>
+                  <a:cs typeface="+mn-cs"/>
+                </a:defRPr>
+              </a:pPr>
+              <a:endParaRPr lang="es-ES"/>
+            </a:p>
+          </c:txPr>
+        </c:title>
         <c:numFmt formatCode="General" sourceLinked="1"/>
         <c:majorTickMark val="none"/>
         <c:minorTickMark val="none"/>
@@ -2380,7 +2490,7 @@
           <a:lstStyle/>
           <a:p>
             <a:pPr>
-              <a:defRPr sz="900" b="0" i="0" u="none" strike="noStrike" kern="1200" baseline="0">
+              <a:defRPr sz="1200" b="0" i="0" u="none" strike="noStrike" kern="1200" baseline="0">
                 <a:solidFill>
                   <a:schemeClr val="tx1">
                     <a:lumMod val="65000"/>
@@ -2430,7 +2540,7 @@
     <a:lstStyle/>
     <a:p>
       <a:pPr>
-        <a:defRPr/>
+        <a:defRPr sz="1200"/>
       </a:pPr>
       <a:endParaRPr lang="es-ES"/>
     </a:p>
@@ -2462,7 +2572,7 @@
           <a:lstStyle/>
           <a:p>
             <a:pPr>
-              <a:defRPr sz="1400" b="0" i="0" u="none" strike="noStrike" kern="1200" spc="0" baseline="0">
+              <a:defRPr sz="1440" b="0" i="0" u="none" strike="noStrike" kern="1200" spc="0" baseline="0">
                 <a:solidFill>
                   <a:schemeClr val="tx1">
                     <a:lumMod val="65000"/>
@@ -2494,7 +2604,7 @@
         <a:lstStyle/>
         <a:p>
           <a:pPr>
-            <a:defRPr sz="1400" b="0" i="0" u="none" strike="noStrike" kern="1200" spc="0" baseline="0">
+            <a:defRPr sz="1440" b="0" i="0" u="none" strike="noStrike" kern="1200" spc="0" baseline="0">
               <a:solidFill>
                 <a:schemeClr val="tx1">
                   <a:lumMod val="65000"/>
@@ -4598,6 +4708,61 @@
             <a:effectLst/>
           </c:spPr>
         </c:majorGridlines>
+        <c:title>
+          <c:tx>
+            <c:rich>
+              <a:bodyPr rot="0" spcFirstLastPara="1" vertOverflow="ellipsis" vert="horz" wrap="square" anchor="ctr" anchorCtr="1"/>
+              <a:lstStyle/>
+              <a:p>
+                <a:pPr>
+                  <a:defRPr sz="1200" b="0" i="0" u="none" strike="noStrike" kern="1200" baseline="0">
+                    <a:solidFill>
+                      <a:schemeClr val="tx1">
+                        <a:lumMod val="65000"/>
+                        <a:lumOff val="35000"/>
+                      </a:schemeClr>
+                    </a:solidFill>
+                    <a:latin typeface="+mn-lt"/>
+                    <a:ea typeface="+mn-ea"/>
+                    <a:cs typeface="+mn-cs"/>
+                  </a:defRPr>
+                </a:pPr>
+                <a:r>
+                  <a:rPr lang="es-ES"/>
+                  <a:t>Flujo</a:t>
+                </a:r>
+              </a:p>
+            </c:rich>
+          </c:tx>
+          <c:overlay val="0"/>
+          <c:spPr>
+            <a:noFill/>
+            <a:ln>
+              <a:noFill/>
+            </a:ln>
+            <a:effectLst/>
+          </c:spPr>
+          <c:txPr>
+            <a:bodyPr rot="0" spcFirstLastPara="1" vertOverflow="ellipsis" vert="horz" wrap="square" anchor="ctr" anchorCtr="1"/>
+            <a:lstStyle/>
+            <a:p>
+              <a:pPr>
+                <a:defRPr sz="1200" b="0" i="0" u="none" strike="noStrike" kern="1200" baseline="0">
+                  <a:solidFill>
+                    <a:schemeClr val="tx1">
+                      <a:lumMod val="65000"/>
+                      <a:lumOff val="35000"/>
+                    </a:schemeClr>
+                  </a:solidFill>
+                  <a:latin typeface="+mn-lt"/>
+                  <a:ea typeface="+mn-ea"/>
+                  <a:cs typeface="+mn-cs"/>
+                </a:defRPr>
+              </a:pPr>
+              <a:endParaRPr lang="es-ES"/>
+            </a:p>
+          </c:txPr>
+        </c:title>
         <c:numFmt formatCode="General" sourceLinked="1"/>
         <c:majorTickMark val="none"/>
         <c:minorTickMark val="none"/>
@@ -4620,7 +4785,7 @@
           <a:lstStyle/>
           <a:p>
             <a:pPr>
-              <a:defRPr sz="900" b="0" i="0" u="none" strike="noStrike" kern="1200" baseline="0">
+              <a:defRPr sz="1200" b="0" i="0" u="none" strike="noStrike" kern="1200" baseline="0">
                 <a:solidFill>
                   <a:schemeClr val="tx1">
                     <a:lumMod val="65000"/>
@@ -4660,6 +4825,61 @@
             <a:effectLst/>
           </c:spPr>
         </c:majorGridlines>
+        <c:title>
+          <c:tx>
+            <c:rich>
+              <a:bodyPr rot="-5400000" spcFirstLastPara="1" vertOverflow="ellipsis" vert="horz" wrap="square" anchor="ctr" anchorCtr="1"/>
+              <a:lstStyle/>
+              <a:p>
+                <a:pPr>
+                  <a:defRPr sz="1200" b="0" i="0" u="none" strike="noStrike" kern="1200" baseline="0">
+                    <a:solidFill>
+                      <a:schemeClr val="tx1">
+                        <a:lumMod val="65000"/>
+                        <a:lumOff val="35000"/>
+                      </a:schemeClr>
+                    </a:solidFill>
+                    <a:latin typeface="+mn-lt"/>
+                    <a:ea typeface="+mn-ea"/>
+                    <a:cs typeface="+mn-cs"/>
+                  </a:defRPr>
+                </a:pPr>
+                <a:r>
+                  <a:rPr lang="es-ES"/>
+                  <a:t>R2</a:t>
+                </a:r>
+              </a:p>
+            </c:rich>
+          </c:tx>
+          <c:overlay val="0"/>
+          <c:spPr>
+            <a:noFill/>
+            <a:ln>
+              <a:noFill/>
+            </a:ln>
+            <a:effectLst/>
+          </c:spPr>
+          <c:txPr>
+            <a:bodyPr rot="-5400000" spcFirstLastPara="1" vertOverflow="ellipsis" vert="horz" wrap="square" anchor="ctr" anchorCtr="1"/>
+            <a:lstStyle/>
+            <a:p>
+              <a:pPr>
+                <a:defRPr sz="1200" b="0" i="0" u="none" strike="noStrike" kern="1200" baseline="0">
+                  <a:solidFill>
+                    <a:schemeClr val="tx1">
+                      <a:lumMod val="65000"/>
+                      <a:lumOff val="35000"/>
+                    </a:schemeClr>
+                  </a:solidFill>
+                  <a:latin typeface="+mn-lt"/>
+                  <a:ea typeface="+mn-ea"/>
+                  <a:cs typeface="+mn-cs"/>
+                </a:defRPr>
+              </a:pPr>
+              <a:endParaRPr lang="es-ES"/>
+            </a:p>
+          </c:txPr>
+        </c:title>
         <c:numFmt formatCode="General" sourceLinked="1"/>
         <c:majorTickMark val="none"/>
         <c:minorTickMark val="none"/>
@@ -4682,7 +4902,7 @@
           <a:lstStyle/>
           <a:p>
             <a:pPr>
-              <a:defRPr sz="900" b="0" i="0" u="none" strike="noStrike" kern="1200" baseline="0">
+              <a:defRPr sz="1200" b="0" i="0" u="none" strike="noStrike" kern="1200" baseline="0">
                 <a:solidFill>
                   <a:schemeClr val="tx1">
                     <a:lumMod val="65000"/>
@@ -4725,7 +4945,7 @@
     <a:lstStyle/>
     <a:p>
       <a:pPr>
-        <a:defRPr/>
+        <a:defRPr sz="1200"/>
       </a:pPr>
       <a:endParaRPr lang="es-ES"/>
     </a:p>
@@ -4757,7 +4977,7 @@
           <a:lstStyle/>
           <a:p>
             <a:pPr>
-              <a:defRPr sz="1400" b="0" i="0" u="none" strike="noStrike" kern="1200" spc="0" baseline="0">
+              <a:defRPr sz="1440" b="0" i="0" u="none" strike="noStrike" kern="1200" spc="0" baseline="0">
                 <a:solidFill>
                   <a:schemeClr val="tx1">
                     <a:lumMod val="65000"/>
@@ -4789,7 +5009,7 @@
         <a:lstStyle/>
         <a:p>
           <a:pPr>
-            <a:defRPr sz="1400" b="0" i="0" u="none" strike="noStrike" kern="1200" spc="0" baseline="0">
+            <a:defRPr sz="1440" b="0" i="0" u="none" strike="noStrike" kern="1200" spc="0" baseline="0">
               <a:solidFill>
                 <a:schemeClr val="tx1">
                   <a:lumMod val="65000"/>
@@ -6939,6 +7159,61 @@
             <a:effectLst/>
           </c:spPr>
         </c:majorGridlines>
+        <c:title>
+          <c:tx>
+            <c:rich>
+              <a:bodyPr rot="0" spcFirstLastPara="1" vertOverflow="ellipsis" vert="horz" wrap="square" anchor="ctr" anchorCtr="1"/>
+              <a:lstStyle/>
+              <a:p>
+                <a:pPr>
+                  <a:defRPr sz="1200" b="0" i="0" u="none" strike="noStrike" kern="1200" baseline="0">
+                    <a:solidFill>
+                      <a:schemeClr val="tx1">
+                        <a:lumMod val="65000"/>
+                        <a:lumOff val="35000"/>
+                      </a:schemeClr>
+                    </a:solidFill>
+                    <a:latin typeface="+mn-lt"/>
+                    <a:ea typeface="+mn-ea"/>
+                    <a:cs typeface="+mn-cs"/>
+                  </a:defRPr>
+                </a:pPr>
+                <a:r>
+                  <a:rPr lang="es-ES"/>
+                  <a:t>Flujo</a:t>
+                </a:r>
+              </a:p>
+            </c:rich>
+          </c:tx>
+          <c:overlay val="0"/>
+          <c:spPr>
+            <a:noFill/>
+            <a:ln>
+              <a:noFill/>
+            </a:ln>
+            <a:effectLst/>
+          </c:spPr>
+          <c:txPr>
+            <a:bodyPr rot="0" spcFirstLastPara="1" vertOverflow="ellipsis" vert="horz" wrap="square" anchor="ctr" anchorCtr="1"/>
+            <a:lstStyle/>
+            <a:p>
+              <a:pPr>
+                <a:defRPr sz="1200" b="0" i="0" u="none" strike="noStrike" kern="1200" baseline="0">
+                  <a:solidFill>
+                    <a:schemeClr val="tx1">
+                      <a:lumMod val="65000"/>
+                      <a:lumOff val="35000"/>
+                    </a:schemeClr>
+                  </a:solidFill>
+                  <a:latin typeface="+mn-lt"/>
+                  <a:ea typeface="+mn-ea"/>
+                  <a:cs typeface="+mn-cs"/>
+                </a:defRPr>
+              </a:pPr>
+              <a:endParaRPr lang="es-ES"/>
+            </a:p>
+          </c:txPr>
+        </c:title>
         <c:numFmt formatCode="General" sourceLinked="1"/>
         <c:majorTickMark val="none"/>
         <c:minorTickMark val="none"/>
@@ -6961,7 +7236,7 @@
           <a:lstStyle/>
           <a:p>
             <a:pPr>
-              <a:defRPr sz="900" b="0" i="0" u="none" strike="noStrike" kern="1200" baseline="0">
+              <a:defRPr sz="1200" b="0" i="0" u="none" strike="noStrike" kern="1200" baseline="0">
                 <a:solidFill>
                   <a:schemeClr val="tx1">
                     <a:lumMod val="65000"/>
@@ -7001,6 +7276,61 @@
             <a:effectLst/>
           </c:spPr>
         </c:majorGridlines>
+        <c:title>
+          <c:tx>
+            <c:rich>
+              <a:bodyPr rot="-5400000" spcFirstLastPara="1" vertOverflow="ellipsis" vert="horz" wrap="square" anchor="ctr" anchorCtr="1"/>
+              <a:lstStyle/>
+              <a:p>
+                <a:pPr>
+                  <a:defRPr sz="1200" b="0" i="0" u="none" strike="noStrike" kern="1200" baseline="0">
+                    <a:solidFill>
+                      <a:schemeClr val="tx1">
+                        <a:lumMod val="65000"/>
+                        <a:lumOff val="35000"/>
+                      </a:schemeClr>
+                    </a:solidFill>
+                    <a:latin typeface="+mn-lt"/>
+                    <a:ea typeface="+mn-ea"/>
+                    <a:cs typeface="+mn-cs"/>
+                  </a:defRPr>
+                </a:pPr>
+                <a:r>
+                  <a:rPr lang="es-ES"/>
+                  <a:t>R2</a:t>
+                </a:r>
+              </a:p>
+            </c:rich>
+          </c:tx>
+          <c:overlay val="0"/>
+          <c:spPr>
+            <a:noFill/>
+            <a:ln>
+              <a:noFill/>
+            </a:ln>
+            <a:effectLst/>
+          </c:spPr>
+          <c:txPr>
+            <a:bodyPr rot="-5400000" spcFirstLastPara="1" vertOverflow="ellipsis" vert="horz" wrap="square" anchor="ctr" anchorCtr="1"/>
+            <a:lstStyle/>
+            <a:p>
+              <a:pPr>
+                <a:defRPr sz="1200" b="0" i="0" u="none" strike="noStrike" kern="1200" baseline="0">
+                  <a:solidFill>
+                    <a:schemeClr val="tx1">
+                      <a:lumMod val="65000"/>
+                      <a:lumOff val="35000"/>
+                    </a:schemeClr>
+                  </a:solidFill>
+                  <a:latin typeface="+mn-lt"/>
+                  <a:ea typeface="+mn-ea"/>
+                  <a:cs typeface="+mn-cs"/>
+                </a:defRPr>
+              </a:pPr>
+              <a:endParaRPr lang="es-ES"/>
+            </a:p>
+          </c:txPr>
+        </c:title>
         <c:numFmt formatCode="General" sourceLinked="1"/>
         <c:majorTickMark val="none"/>
         <c:minorTickMark val="none"/>
@@ -7023,7 +7353,7 @@
           <a:lstStyle/>
           <a:p>
             <a:pPr>
-              <a:defRPr sz="900" b="0" i="0" u="none" strike="noStrike" kern="1200" baseline="0">
+              <a:defRPr sz="1200" b="0" i="0" u="none" strike="noStrike" kern="1200" baseline="0">
                 <a:solidFill>
                   <a:schemeClr val="tx1">
                     <a:lumMod val="65000"/>
@@ -7073,7 +7403,7 @@
     <a:lstStyle/>
     <a:p>
       <a:pPr>
-        <a:defRPr/>
+        <a:defRPr sz="1200"/>
       </a:pPr>
       <a:endParaRPr lang="es-ES"/>
     </a:p>
@@ -7105,7 +7435,7 @@
           <a:lstStyle/>
           <a:p>
             <a:pPr>
-              <a:defRPr sz="1400" b="0" i="0" u="none" strike="noStrike" kern="1200" spc="0" baseline="0">
+              <a:defRPr sz="1440" b="0" i="0" u="none" strike="noStrike" kern="1200" spc="0" baseline="0">
                 <a:solidFill>
                   <a:schemeClr val="tx1">
                     <a:lumMod val="65000"/>
@@ -7137,7 +7467,7 @@
         <a:lstStyle/>
         <a:p>
           <a:pPr>
-            <a:defRPr sz="1400" b="0" i="0" u="none" strike="noStrike" kern="1200" spc="0" baseline="0">
+            <a:defRPr sz="1440" b="0" i="0" u="none" strike="noStrike" kern="1200" spc="0" baseline="0">
               <a:solidFill>
                 <a:schemeClr val="tx1">
                   <a:lumMod val="65000"/>
@@ -9287,6 +9617,61 @@
             <a:effectLst/>
           </c:spPr>
         </c:majorGridlines>
+        <c:title>
+          <c:tx>
+            <c:rich>
+              <a:bodyPr rot="0" spcFirstLastPara="1" vertOverflow="ellipsis" vert="horz" wrap="square" anchor="ctr" anchorCtr="1"/>
+              <a:lstStyle/>
+              <a:p>
+                <a:pPr>
+                  <a:defRPr sz="1200" b="0" i="0" u="none" strike="noStrike" kern="1200" baseline="0">
+                    <a:solidFill>
+                      <a:schemeClr val="tx1">
+                        <a:lumMod val="65000"/>
+                        <a:lumOff val="35000"/>
+                      </a:schemeClr>
+                    </a:solidFill>
+                    <a:latin typeface="+mn-lt"/>
+                    <a:ea typeface="+mn-ea"/>
+                    <a:cs typeface="+mn-cs"/>
+                  </a:defRPr>
+                </a:pPr>
+                <a:r>
+                  <a:rPr lang="es-ES"/>
+                  <a:t>Flujo</a:t>
+                </a:r>
+              </a:p>
+            </c:rich>
+          </c:tx>
+          <c:overlay val="0"/>
+          <c:spPr>
+            <a:noFill/>
+            <a:ln>
+              <a:noFill/>
+            </a:ln>
+            <a:effectLst/>
+          </c:spPr>
+          <c:txPr>
+            <a:bodyPr rot="0" spcFirstLastPara="1" vertOverflow="ellipsis" vert="horz" wrap="square" anchor="ctr" anchorCtr="1"/>
+            <a:lstStyle/>
+            <a:p>
+              <a:pPr>
+                <a:defRPr sz="1200" b="0" i="0" u="none" strike="noStrike" kern="1200" baseline="0">
+                  <a:solidFill>
+                    <a:schemeClr val="tx1">
+                      <a:lumMod val="65000"/>
+                      <a:lumOff val="35000"/>
+                    </a:schemeClr>
+                  </a:solidFill>
+                  <a:latin typeface="+mn-lt"/>
+                  <a:ea typeface="+mn-ea"/>
+                  <a:cs typeface="+mn-cs"/>
+                </a:defRPr>
+              </a:pPr>
+              <a:endParaRPr lang="es-ES"/>
+            </a:p>
+          </c:txPr>
+        </c:title>
         <c:numFmt formatCode="General" sourceLinked="1"/>
         <c:majorTickMark val="none"/>
         <c:minorTickMark val="none"/>
@@ -9309,7 +9694,7 @@
           <a:lstStyle/>
           <a:p>
             <a:pPr>
-              <a:defRPr sz="900" b="0" i="0" u="none" strike="noStrike" kern="1200" baseline="0">
+              <a:defRPr sz="1200" b="0" i="0" u="none" strike="noStrike" kern="1200" baseline="0">
                 <a:solidFill>
                   <a:schemeClr val="tx1">
                     <a:lumMod val="65000"/>
@@ -9349,6 +9734,61 @@
             <a:effectLst/>
           </c:spPr>
         </c:majorGridlines>
+        <c:title>
+          <c:tx>
+            <c:rich>
+              <a:bodyPr rot="-5400000" spcFirstLastPara="1" vertOverflow="ellipsis" vert="horz" wrap="square" anchor="ctr" anchorCtr="1"/>
+              <a:lstStyle/>
+              <a:p>
+                <a:pPr>
+                  <a:defRPr sz="1200" b="0" i="0" u="none" strike="noStrike" kern="1200" baseline="0">
+                    <a:solidFill>
+                      <a:schemeClr val="tx1">
+                        <a:lumMod val="65000"/>
+                        <a:lumOff val="35000"/>
+                      </a:schemeClr>
+                    </a:solidFill>
+                    <a:latin typeface="+mn-lt"/>
+                    <a:ea typeface="+mn-ea"/>
+                    <a:cs typeface="+mn-cs"/>
+                  </a:defRPr>
+                </a:pPr>
+                <a:r>
+                  <a:rPr lang="es-ES"/>
+                  <a:t>R2</a:t>
+                </a:r>
+              </a:p>
+            </c:rich>
+          </c:tx>
+          <c:overlay val="0"/>
+          <c:spPr>
+            <a:noFill/>
+            <a:ln>
+              <a:noFill/>
+            </a:ln>
+            <a:effectLst/>
+          </c:spPr>
+          <c:txPr>
+            <a:bodyPr rot="-5400000" spcFirstLastPara="1" vertOverflow="ellipsis" vert="horz" wrap="square" anchor="ctr" anchorCtr="1"/>
+            <a:lstStyle/>
+            <a:p>
+              <a:pPr>
+                <a:defRPr sz="1200" b="0" i="0" u="none" strike="noStrike" kern="1200" baseline="0">
+                  <a:solidFill>
+                    <a:schemeClr val="tx1">
+                      <a:lumMod val="65000"/>
+                      <a:lumOff val="35000"/>
+                    </a:schemeClr>
+                  </a:solidFill>
+                  <a:latin typeface="+mn-lt"/>
+                  <a:ea typeface="+mn-ea"/>
+                  <a:cs typeface="+mn-cs"/>
+                </a:defRPr>
+              </a:pPr>
+              <a:endParaRPr lang="es-ES"/>
+            </a:p>
+          </c:txPr>
+        </c:title>
         <c:numFmt formatCode="General" sourceLinked="1"/>
         <c:majorTickMark val="none"/>
         <c:minorTickMark val="none"/>
@@ -9371,7 +9811,7 @@
           <a:lstStyle/>
           <a:p>
             <a:pPr>
-              <a:defRPr sz="900" b="0" i="0" u="none" strike="noStrike" kern="1200" baseline="0">
+              <a:defRPr sz="1200" b="0" i="0" u="none" strike="noStrike" kern="1200" baseline="0">
                 <a:solidFill>
                   <a:schemeClr val="tx1">
                     <a:lumMod val="65000"/>
@@ -9421,7 +9861,7 @@
     <a:lstStyle/>
     <a:p>
       <a:pPr>
-        <a:defRPr/>
+        <a:defRPr sz="1200"/>
       </a:pPr>
       <a:endParaRPr lang="es-ES"/>
     </a:p>
@@ -9453,7 +9893,7 @@
           <a:lstStyle/>
           <a:p>
             <a:pPr>
-              <a:defRPr sz="1400" b="0" i="0" u="none" strike="noStrike" kern="1200" spc="0" baseline="0">
+              <a:defRPr sz="1440" b="0" i="0" u="none" strike="noStrike" kern="1200" spc="0" baseline="0">
                 <a:solidFill>
                   <a:schemeClr val="tx1">
                     <a:lumMod val="65000"/>
@@ -9485,7 +9925,7 @@
         <a:lstStyle/>
         <a:p>
           <a:pPr>
-            <a:defRPr sz="1400" b="0" i="0" u="none" strike="noStrike" kern="1200" spc="0" baseline="0">
+            <a:defRPr sz="1440" b="0" i="0" u="none" strike="noStrike" kern="1200" spc="0" baseline="0">
               <a:solidFill>
                 <a:schemeClr val="tx1">
                   <a:lumMod val="65000"/>
@@ -15144,7 +15584,7 @@
               <a:lstStyle/>
               <a:p>
                 <a:pPr>
-                  <a:defRPr sz="1000" b="0" i="0" u="none" strike="noStrike" kern="1200" baseline="0">
+                  <a:defRPr sz="1200" b="0" i="0" u="none" strike="noStrike" kern="1200" baseline="0">
                     <a:solidFill>
                       <a:schemeClr val="tx1">
                         <a:lumMod val="65000"/>
@@ -15176,7 +15616,7 @@
             <a:lstStyle/>
             <a:p>
               <a:pPr>
-                <a:defRPr sz="1000" b="0" i="0" u="none" strike="noStrike" kern="1200" baseline="0">
+                <a:defRPr sz="1200" b="0" i="0" u="none" strike="noStrike" kern="1200" baseline="0">
                   <a:solidFill>
                     <a:schemeClr val="tx1">
                       <a:lumMod val="65000"/>
@@ -15214,7 +15654,7 @@
           <a:lstStyle/>
           <a:p>
             <a:pPr>
-              <a:defRPr sz="900" b="0" i="0" u="none" strike="noStrike" kern="1200" baseline="0">
+              <a:defRPr sz="1200" b="0" i="0" u="none" strike="noStrike" kern="1200" baseline="0">
                 <a:solidFill>
                   <a:schemeClr val="tx1">
                     <a:lumMod val="65000"/>
@@ -15261,7 +15701,7 @@
               <a:lstStyle/>
               <a:p>
                 <a:pPr>
-                  <a:defRPr sz="1000" b="0" i="0" u="none" strike="noStrike" kern="1200" baseline="0">
+                  <a:defRPr sz="1200" b="0" i="0" u="none" strike="noStrike" kern="1200" baseline="0">
                     <a:solidFill>
                       <a:schemeClr val="tx1">
                         <a:lumMod val="65000"/>
@@ -15293,7 +15733,7 @@
             <a:lstStyle/>
             <a:p>
               <a:pPr>
-                <a:defRPr sz="1000" b="0" i="0" u="none" strike="noStrike" kern="1200" baseline="0">
+                <a:defRPr sz="1200" b="0" i="0" u="none" strike="noStrike" kern="1200" baseline="0">
                   <a:solidFill>
                     <a:schemeClr val="tx1">
                       <a:lumMod val="65000"/>
@@ -15331,7 +15771,7 @@
           <a:lstStyle/>
           <a:p>
             <a:pPr>
-              <a:defRPr sz="900" b="0" i="0" u="none" strike="noStrike" kern="1200" baseline="0">
+              <a:defRPr sz="1200" b="0" i="0" u="none" strike="noStrike" kern="1200" baseline="0">
                 <a:solidFill>
                   <a:schemeClr val="tx1">
                     <a:lumMod val="65000"/>
@@ -15381,7 +15821,7 @@
     <a:lstStyle/>
     <a:p>
       <a:pPr>
-        <a:defRPr/>
+        <a:defRPr sz="1200"/>
       </a:pPr>
       <a:endParaRPr lang="es-ES"/>
     </a:p>
@@ -18319,7 +18759,7 @@
           <a:p>
             <a:fld id="{A9C9D7BD-D14A-4492-AB94-ADE9458A406E}" type="datetimeFigureOut">
               <a:rPr lang="es-ES" smtClean="0"/>
-              <a:t>08/09/2023</a:t>
+              <a:t>13/09/2023</a:t>
             </a:fld>
             <a:endParaRPr lang="es-ES"/>
           </a:p>
@@ -18517,7 +18957,7 @@
           <a:p>
             <a:fld id="{A9C9D7BD-D14A-4492-AB94-ADE9458A406E}" type="datetimeFigureOut">
               <a:rPr lang="es-ES" smtClean="0"/>
-              <a:t>08/09/2023</a:t>
+              <a:t>13/09/2023</a:t>
             </a:fld>
             <a:endParaRPr lang="es-ES"/>
           </a:p>
@@ -18725,7 +19165,7 @@
           <a:p>
             <a:fld id="{A9C9D7BD-D14A-4492-AB94-ADE9458A406E}" type="datetimeFigureOut">
               <a:rPr lang="es-ES" smtClean="0"/>
-              <a:t>08/09/2023</a:t>
+              <a:t>13/09/2023</a:t>
             </a:fld>
             <a:endParaRPr lang="es-ES"/>
           </a:p>
@@ -18923,7 +19363,7 @@
           <a:p>
             <a:fld id="{A9C9D7BD-D14A-4492-AB94-ADE9458A406E}" type="datetimeFigureOut">
               <a:rPr lang="es-ES" smtClean="0"/>
-              <a:t>08/09/2023</a:t>
+              <a:t>13/09/2023</a:t>
             </a:fld>
             <a:endParaRPr lang="es-ES"/>
           </a:p>
@@ -19198,7 +19638,7 @@
           <a:p>
             <a:fld id="{A9C9D7BD-D14A-4492-AB94-ADE9458A406E}" type="datetimeFigureOut">
               <a:rPr lang="es-ES" smtClean="0"/>
-              <a:t>08/09/2023</a:t>
+              <a:t>13/09/2023</a:t>
             </a:fld>
             <a:endParaRPr lang="es-ES"/>
           </a:p>
@@ -19463,7 +19903,7 @@
           <a:p>
             <a:fld id="{A9C9D7BD-D14A-4492-AB94-ADE9458A406E}" type="datetimeFigureOut">
               <a:rPr lang="es-ES" smtClean="0"/>
-              <a:t>08/09/2023</a:t>
+              <a:t>13/09/2023</a:t>
             </a:fld>
             <a:endParaRPr lang="es-ES"/>
           </a:p>
@@ -19875,7 +20315,7 @@
           <a:p>
             <a:fld id="{A9C9D7BD-D14A-4492-AB94-ADE9458A406E}" type="datetimeFigureOut">
               <a:rPr lang="es-ES" smtClean="0"/>
-              <a:t>08/09/2023</a:t>
+              <a:t>13/09/2023</a:t>
             </a:fld>
             <a:endParaRPr lang="es-ES"/>
           </a:p>
@@ -20016,7 +20456,7 @@
           <a:p>
             <a:fld id="{A9C9D7BD-D14A-4492-AB94-ADE9458A406E}" type="datetimeFigureOut">
               <a:rPr lang="es-ES" smtClean="0"/>
-              <a:t>08/09/2023</a:t>
+              <a:t>13/09/2023</a:t>
             </a:fld>
             <a:endParaRPr lang="es-ES"/>
           </a:p>
@@ -20129,7 +20569,7 @@
           <a:p>
             <a:fld id="{A9C9D7BD-D14A-4492-AB94-ADE9458A406E}" type="datetimeFigureOut">
               <a:rPr lang="es-ES" smtClean="0"/>
-              <a:t>08/09/2023</a:t>
+              <a:t>13/09/2023</a:t>
             </a:fld>
             <a:endParaRPr lang="es-ES"/>
           </a:p>
@@ -20440,7 +20880,7 @@
           <a:p>
             <a:fld id="{A9C9D7BD-D14A-4492-AB94-ADE9458A406E}" type="datetimeFigureOut">
               <a:rPr lang="es-ES" smtClean="0"/>
-              <a:t>08/09/2023</a:t>
+              <a:t>13/09/2023</a:t>
             </a:fld>
             <a:endParaRPr lang="es-ES"/>
           </a:p>
@@ -20728,7 +21168,7 @@
           <a:p>
             <a:fld id="{A9C9D7BD-D14A-4492-AB94-ADE9458A406E}" type="datetimeFigureOut">
               <a:rPr lang="es-ES" smtClean="0"/>
-              <a:t>08/09/2023</a:t>
+              <a:t>13/09/2023</a:t>
             </a:fld>
             <a:endParaRPr lang="es-ES"/>
           </a:p>
@@ -20969,7 +21409,7 @@
           <a:p>
             <a:fld id="{A9C9D7BD-D14A-4492-AB94-ADE9458A406E}" type="datetimeFigureOut">
               <a:rPr lang="es-ES" smtClean="0"/>
-              <a:t>08/09/2023</a:t>
+              <a:t>13/09/2023</a:t>
             </a:fld>
             <a:endParaRPr lang="es-ES"/>
           </a:p>
@@ -21512,6 +21952,11 @@
           </p:cNvGraphicFramePr>
           <p:nvPr>
             <p:ph idx="1"/>
+            <p:extLst>
+              <p:ext uri="{D42A27DB-BD31-4B8C-83A1-F6EECF244321}">
+                <p14:modId xmlns:p14="http://schemas.microsoft.com/office/powerpoint/2010/main" val="1330842645"/>
+              </p:ext>
+            </p:extLst>
           </p:nvPr>
         </p:nvGraphicFramePr>
         <p:xfrm>
@@ -21597,10 +22042,15 @@
           </p:cNvGraphicFramePr>
           <p:nvPr>
             <p:ph idx="1"/>
+            <p:extLst>
+              <p:ext uri="{D42A27DB-BD31-4B8C-83A1-F6EECF244321}">
+                <p14:modId xmlns:p14="http://schemas.microsoft.com/office/powerpoint/2010/main" val="3067619873"/>
+              </p:ext>
+            </p:extLst>
           </p:nvPr>
         </p:nvGraphicFramePr>
         <p:xfrm>
-          <a:off x="838200" y="1825625"/>
+          <a:off x="838200" y="1816100"/>
           <a:ext cx="10515600" cy="4351338"/>
         </p:xfrm>
         <a:graphic>
@@ -21682,6 +22132,11 @@
           </p:cNvGraphicFramePr>
           <p:nvPr>
             <p:ph idx="1"/>
+            <p:extLst>
+              <p:ext uri="{D42A27DB-BD31-4B8C-83A1-F6EECF244321}">
+                <p14:modId xmlns:p14="http://schemas.microsoft.com/office/powerpoint/2010/main" val="1328137771"/>
+              </p:ext>
+            </p:extLst>
           </p:nvPr>
         </p:nvGraphicFramePr>
         <p:xfrm>
@@ -21766,6 +22221,11 @@
           </p:cNvGraphicFramePr>
           <p:nvPr>
             <p:ph idx="1"/>
+            <p:extLst>
+              <p:ext uri="{D42A27DB-BD31-4B8C-83A1-F6EECF244321}">
+                <p14:modId xmlns:p14="http://schemas.microsoft.com/office/powerpoint/2010/main" val="2825065190"/>
+              </p:ext>
+            </p:extLst>
           </p:nvPr>
         </p:nvGraphicFramePr>
         <p:xfrm>
@@ -21850,6 +22310,11 @@
           </p:cNvGraphicFramePr>
           <p:nvPr>
             <p:ph idx="1"/>
+            <p:extLst>
+              <p:ext uri="{D42A27DB-BD31-4B8C-83A1-F6EECF244321}">
+                <p14:modId xmlns:p14="http://schemas.microsoft.com/office/powerpoint/2010/main" val="3675681839"/>
+              </p:ext>
+            </p:extLst>
           </p:nvPr>
         </p:nvGraphicFramePr>
         <p:xfrm>

</xml_diff>